<commit_message>
first slides almost done
</commit_message>
<xml_diff>
--- a/training-spark/1_Spark.pptx
+++ b/training-spark/1_Spark.pptx
@@ -6,10 +6,10 @@
     <p:sldMasterId id="2147483659" r:id="rId2"/>
   </p:sldMasterIdLst>
   <p:notesMasterIdLst>
-    <p:notesMasterId r:id="rId11"/>
+    <p:notesMasterId r:id="rId15"/>
   </p:notesMasterIdLst>
   <p:handoutMasterIdLst>
-    <p:handoutMasterId r:id="rId12"/>
+    <p:handoutMasterId r:id="rId16"/>
   </p:handoutMasterIdLst>
   <p:sldIdLst>
     <p:sldId id="257" r:id="rId3"/>
@@ -18,8 +18,12 @@
     <p:sldId id="264" r:id="rId6"/>
     <p:sldId id="261" r:id="rId7"/>
     <p:sldId id="259" r:id="rId8"/>
-    <p:sldId id="260" r:id="rId9"/>
-    <p:sldId id="263" r:id="rId10"/>
+    <p:sldId id="265" r:id="rId9"/>
+    <p:sldId id="266" r:id="rId10"/>
+    <p:sldId id="267" r:id="rId11"/>
+    <p:sldId id="268" r:id="rId12"/>
+    <p:sldId id="269" r:id="rId13"/>
+    <p:sldId id="263" r:id="rId14"/>
   </p:sldIdLst>
   <p:sldSz cx="13004800" cy="9753600"/>
   <p:notesSz cx="6858000" cy="9144000"/>
@@ -437,7 +441,7 @@
           <a:p>
             <a:fld id="{154C1C9F-968B-45D4-9FBD-EA39F2175159}" type="datetimeFigureOut">
               <a:rPr lang="en-US" smtClean="0"/>
-              <a:t>7/14/2022</a:t>
+              <a:t>7/16/2022</a:t>
             </a:fld>
             <a:endParaRPr lang="en-US"/>
           </a:p>
@@ -878,6 +882,107 @@
 </p:notes>
 </file>
 
+<file path=ppt/notesSlides/notesSlide3.xml><?xml version="1.0" encoding="utf-8"?>
+<p:notes xmlns:a="http://schemas.openxmlformats.org/drawingml/2006/main" xmlns:r="http://schemas.openxmlformats.org/officeDocument/2006/relationships" xmlns:p="http://schemas.openxmlformats.org/presentationml/2006/main">
+  <p:cSld>
+    <p:spTree>
+      <p:nvGrpSpPr>
+        <p:cNvPr id="1" name=""/>
+        <p:cNvGrpSpPr/>
+        <p:nvPr/>
+      </p:nvGrpSpPr>
+      <p:grpSpPr>
+        <a:xfrm>
+          <a:off x="0" y="0"/>
+          <a:ext cx="0" cy="0"/>
+          <a:chOff x="0" y="0"/>
+          <a:chExt cx="0" cy="0"/>
+        </a:xfrm>
+      </p:grpSpPr>
+      <p:sp>
+        <p:nvSpPr>
+          <p:cNvPr id="2" name="Slide Image Placeholder 1"/>
+          <p:cNvSpPr>
+            <a:spLocks noGrp="1" noRot="1" noChangeAspect="1"/>
+          </p:cNvSpPr>
+          <p:nvPr>
+            <p:ph type="sldImg"/>
+          </p:nvPr>
+        </p:nvSpPr>
+        <p:spPr/>
+      </p:sp>
+      <p:sp>
+        <p:nvSpPr>
+          <p:cNvPr id="3" name="Notes Placeholder 2"/>
+          <p:cNvSpPr>
+            <a:spLocks noGrp="1"/>
+          </p:cNvSpPr>
+          <p:nvPr>
+            <p:ph type="body" idx="1"/>
+          </p:nvPr>
+        </p:nvSpPr>
+        <p:spPr/>
+        <p:txBody>
+          <a:bodyPr/>
+          <a:lstStyle/>
+          <a:p>
+            <a:r>
+              <a:rPr lang="en-US" dirty="0"/>
+              <a:t>Each application gets its own executor processes, which stay up for the duration of the whole application and run tasks in multiple threads.</a:t>
+            </a:r>
+          </a:p>
+          <a:p>
+            <a:endParaRPr lang="en-US" dirty="0"/>
+          </a:p>
+          <a:p>
+            <a:pPr marL="0" marR="0" lvl="0" indent="0" defTabSz="457200" eaLnBrk="1" fontAlgn="auto" latinLnBrk="0" hangingPunct="1">
+              <a:lnSpc>
+                <a:spcPct val="117999"/>
+              </a:lnSpc>
+              <a:spcBef>
+                <a:spcPts val="0"/>
+              </a:spcBef>
+              <a:spcAft>
+                <a:spcPts val="0"/>
+              </a:spcAft>
+              <a:buClrTx/>
+              <a:buSzTx/>
+              <a:buFontTx/>
+              <a:buNone/>
+              <a:tabLst/>
+              <a:defRPr/>
+            </a:pPr>
+            <a:r>
+              <a:rPr lang="en-US" dirty="0"/>
+              <a:t>This has the benefit of isolating applications from each other, on both the scheduling side (each driver schedules its own tasks) and executor side (tasks from different applications run in different JVMs). However, it also means that data cannot be shared across different Spark applications (instances of </a:t>
+            </a:r>
+            <a:r>
+              <a:rPr lang="en-US" dirty="0" err="1"/>
+              <a:t>SparkContext</a:t>
+            </a:r>
+            <a:r>
+              <a:rPr lang="en-US" dirty="0"/>
+              <a:t>) without writing it to an external storage system.</a:t>
+            </a:r>
+          </a:p>
+          <a:p>
+            <a:endParaRPr lang="en-US" dirty="0"/>
+          </a:p>
+        </p:txBody>
+      </p:sp>
+    </p:spTree>
+    <p:extLst>
+      <p:ext uri="{BB962C8B-B14F-4D97-AF65-F5344CB8AC3E}">
+        <p14:creationId xmlns:p14="http://schemas.microsoft.com/office/powerpoint/2010/main" val="4076460491"/>
+      </p:ext>
+    </p:extLst>
+  </p:cSld>
+  <p:clrMapOvr>
+    <a:masterClrMapping/>
+  </p:clrMapOvr>
+</p:notes>
+</file>
+
 <file path=ppt/slideLayouts/slideLayout1.xml><?xml version="1.0" encoding="utf-8"?>
 <p:sldLayout xmlns:a="http://schemas.openxmlformats.org/drawingml/2006/main" xmlns:r="http://schemas.openxmlformats.org/officeDocument/2006/relationships" xmlns:p="http://schemas.openxmlformats.org/presentationml/2006/main" preserve="1" userDrawn="1">
   <p:cSld name="Slide_Titolo introduttivo">
@@ -1621,7 +1726,7 @@
           <a:p>
             <a:fld id="{0F1B7D9C-4F60-C246-8CA4-396C0346DE33}" type="datetimeFigureOut">
               <a:rPr lang="it-IT" smtClean="0"/>
-              <a:t>14/07/2022</a:t>
+              <a:t>16/07/2022</a:t>
             </a:fld>
             <a:endParaRPr lang="it-IT"/>
           </a:p>
@@ -2276,7 +2381,7 @@
           <a:p>
             <a:fld id="{A2FF5F4A-4507-894B-98D1-9441DD15C475}" type="datetimeFigureOut">
               <a:rPr lang="it-IT" smtClean="0"/>
-              <a:t>14/07/2022</a:t>
+              <a:t>16/07/2022</a:t>
             </a:fld>
             <a:endParaRPr lang="it-IT" dirty="0"/>
           </a:p>
@@ -2818,6 +2923,828 @@
 </p:sld>
 </file>
 
+<file path=ppt/slides/slide10.xml><?xml version="1.0" encoding="utf-8"?>
+<p:sld xmlns:a="http://schemas.openxmlformats.org/drawingml/2006/main" xmlns:r="http://schemas.openxmlformats.org/officeDocument/2006/relationships" xmlns:p="http://schemas.openxmlformats.org/presentationml/2006/main">
+  <p:cSld>
+    <p:spTree>
+      <p:nvGrpSpPr>
+        <p:cNvPr id="1" name=""/>
+        <p:cNvGrpSpPr/>
+        <p:nvPr/>
+      </p:nvGrpSpPr>
+      <p:grpSpPr>
+        <a:xfrm>
+          <a:off x="0" y="0"/>
+          <a:ext cx="0" cy="0"/>
+          <a:chOff x="0" y="0"/>
+          <a:chExt cx="0" cy="0"/>
+        </a:xfrm>
+      </p:grpSpPr>
+      <p:sp>
+        <p:nvSpPr>
+          <p:cNvPr id="2" name="Text Placeholder 1">
+            <a:extLst>
+              <a:ext uri="{FF2B5EF4-FFF2-40B4-BE49-F238E27FC236}">
+                <a16:creationId xmlns:a16="http://schemas.microsoft.com/office/drawing/2014/main" id="{F29E16DD-BF30-BD89-4FF6-8C9E304CAC9D}"/>
+              </a:ext>
+            </a:extLst>
+          </p:cNvPr>
+          <p:cNvSpPr>
+            <a:spLocks noGrp="1"/>
+          </p:cNvSpPr>
+          <p:nvPr>
+            <p:ph type="body" sz="quarter" idx="15"/>
+          </p:nvPr>
+        </p:nvSpPr>
+        <p:spPr/>
+        <p:txBody>
+          <a:bodyPr/>
+          <a:lstStyle/>
+          <a:p>
+            <a:endParaRPr lang="en-US"/>
+          </a:p>
+        </p:txBody>
+      </p:sp>
+      <p:sp>
+        <p:nvSpPr>
+          <p:cNvPr id="3" name="Text Placeholder 2">
+            <a:extLst>
+              <a:ext uri="{FF2B5EF4-FFF2-40B4-BE49-F238E27FC236}">
+                <a16:creationId xmlns:a16="http://schemas.microsoft.com/office/drawing/2014/main" id="{53247260-3BCF-E841-5693-E916D73ABED2}"/>
+              </a:ext>
+            </a:extLst>
+          </p:cNvPr>
+          <p:cNvSpPr>
+            <a:spLocks noGrp="1"/>
+          </p:cNvSpPr>
+          <p:nvPr>
+            <p:ph type="body" sz="quarter" idx="17"/>
+          </p:nvPr>
+        </p:nvSpPr>
+        <p:spPr/>
+        <p:txBody>
+          <a:bodyPr/>
+          <a:lstStyle/>
+          <a:p>
+            <a:endParaRPr lang="en-US"/>
+          </a:p>
+        </p:txBody>
+      </p:sp>
+      <p:sp>
+        <p:nvSpPr>
+          <p:cNvPr id="4" name="Text Placeholder 3">
+            <a:extLst>
+              <a:ext uri="{FF2B5EF4-FFF2-40B4-BE49-F238E27FC236}">
+                <a16:creationId xmlns:a16="http://schemas.microsoft.com/office/drawing/2014/main" id="{CA2A1045-817D-A69B-05F7-94943C8EAF8A}"/>
+              </a:ext>
+            </a:extLst>
+          </p:cNvPr>
+          <p:cNvSpPr>
+            <a:spLocks noGrp="1"/>
+          </p:cNvSpPr>
+          <p:nvPr>
+            <p:ph type="body" sz="quarter" idx="16"/>
+          </p:nvPr>
+        </p:nvSpPr>
+        <p:spPr/>
+        <p:txBody>
+          <a:bodyPr/>
+          <a:lstStyle/>
+          <a:p>
+            <a:endParaRPr lang="en-US"/>
+          </a:p>
+        </p:txBody>
+      </p:sp>
+      <p:sp>
+        <p:nvSpPr>
+          <p:cNvPr id="5" name="Title 4">
+            <a:extLst>
+              <a:ext uri="{FF2B5EF4-FFF2-40B4-BE49-F238E27FC236}">
+                <a16:creationId xmlns:a16="http://schemas.microsoft.com/office/drawing/2014/main" id="{99EB84DA-AEAD-0BC4-7656-5D49752E6712}"/>
+              </a:ext>
+            </a:extLst>
+          </p:cNvPr>
+          <p:cNvSpPr>
+            <a:spLocks noGrp="1"/>
+          </p:cNvSpPr>
+          <p:nvPr>
+            <p:ph type="title"/>
+          </p:nvPr>
+        </p:nvSpPr>
+        <p:spPr/>
+        <p:txBody>
+          <a:bodyPr/>
+          <a:lstStyle/>
+          <a:p>
+            <a:r>
+              <a:rPr lang="en-US" dirty="0"/>
+              <a:t>Tasks and</a:t>
+            </a:r>
+          </a:p>
+        </p:txBody>
+      </p:sp>
+      <p:sp>
+        <p:nvSpPr>
+          <p:cNvPr id="6" name="Content Placeholder 5">
+            <a:extLst>
+              <a:ext uri="{FF2B5EF4-FFF2-40B4-BE49-F238E27FC236}">
+                <a16:creationId xmlns:a16="http://schemas.microsoft.com/office/drawing/2014/main" id="{0FE97F48-8517-4C80-D32A-D0AC264F2E09}"/>
+              </a:ext>
+            </a:extLst>
+          </p:cNvPr>
+          <p:cNvSpPr>
+            <a:spLocks noGrp="1"/>
+          </p:cNvSpPr>
+          <p:nvPr>
+            <p:ph idx="1"/>
+          </p:nvPr>
+        </p:nvSpPr>
+        <p:spPr/>
+        <p:txBody>
+          <a:bodyPr/>
+          <a:lstStyle/>
+          <a:p>
+            <a:pPr marL="0" indent="0">
+              <a:buNone/>
+            </a:pPr>
+            <a:r>
+              <a:rPr lang="en-US" dirty="0"/>
+              <a:t>Each stage is comprised of Spark tasks (a unit of execution), which are then federated across each Spark executor; each task maps to a single core and works on a single partition of data.</a:t>
+            </a:r>
+          </a:p>
+        </p:txBody>
+      </p:sp>
+      <p:pic>
+        <p:nvPicPr>
+          <p:cNvPr id="8" name="Picture 7">
+            <a:extLst>
+              <a:ext uri="{FF2B5EF4-FFF2-40B4-BE49-F238E27FC236}">
+                <a16:creationId xmlns:a16="http://schemas.microsoft.com/office/drawing/2014/main" id="{89C86868-A910-AF34-CDC4-DBC4CF34F24F}"/>
+              </a:ext>
+            </a:extLst>
+          </p:cNvPr>
+          <p:cNvPicPr>
+            <a:picLocks noChangeAspect="1"/>
+          </p:cNvPicPr>
+          <p:nvPr/>
+        </p:nvPicPr>
+        <p:blipFill rotWithShape="1">
+          <a:blip r:embed="rId2"/>
+          <a:srcRect l="1" r="-1"/>
+          <a:stretch/>
+        </p:blipFill>
+        <p:spPr>
+          <a:xfrm>
+            <a:off x="0" y="4082095"/>
+            <a:ext cx="13004800" cy="3718468"/>
+          </a:xfrm>
+          <a:prstGeom prst="rect">
+            <a:avLst/>
+          </a:prstGeom>
+        </p:spPr>
+      </p:pic>
+      <p:sp>
+        <p:nvSpPr>
+          <p:cNvPr id="9" name="TextBox 8">
+            <a:extLst>
+              <a:ext uri="{FF2B5EF4-FFF2-40B4-BE49-F238E27FC236}">
+                <a16:creationId xmlns:a16="http://schemas.microsoft.com/office/drawing/2014/main" id="{3E9BCE19-1EC4-D977-5F4B-809DAE0D5661}"/>
+              </a:ext>
+            </a:extLst>
+          </p:cNvPr>
+          <p:cNvSpPr txBox="1"/>
+          <p:nvPr/>
+        </p:nvSpPr>
+        <p:spPr>
+          <a:xfrm>
+            <a:off x="51961" y="9412245"/>
+            <a:ext cx="2673309" cy="246221"/>
+          </a:xfrm>
+          <a:prstGeom prst="rect">
+            <a:avLst/>
+          </a:prstGeom>
+          <a:noFill/>
+        </p:spPr>
+        <p:txBody>
+          <a:bodyPr wrap="square" rtlCol="0">
+            <a:spAutoFit/>
+          </a:bodyPr>
+          <a:lstStyle/>
+          <a:p>
+            <a:pPr algn="l"/>
+            <a:r>
+              <a:rPr lang="en-US" sz="1000" b="0" dirty="0"/>
+              <a:t>Ref: Learning Spark, </a:t>
+            </a:r>
+            <a:r>
+              <a:rPr lang="en-US" sz="1000" b="0" dirty="0" err="1"/>
+              <a:t>Damji</a:t>
+            </a:r>
+            <a:r>
+              <a:rPr lang="en-US" sz="1000" b="0" dirty="0"/>
+              <a:t> et al</a:t>
+            </a:r>
+          </a:p>
+        </p:txBody>
+      </p:sp>
+    </p:spTree>
+    <p:extLst>
+      <p:ext uri="{BB962C8B-B14F-4D97-AF65-F5344CB8AC3E}">
+        <p14:creationId xmlns:p14="http://schemas.microsoft.com/office/powerpoint/2010/main" val="573699630"/>
+      </p:ext>
+    </p:extLst>
+  </p:cSld>
+  <p:clrMapOvr>
+    <a:masterClrMapping/>
+  </p:clrMapOvr>
+</p:sld>
+</file>
+
+<file path=ppt/slides/slide11.xml><?xml version="1.0" encoding="utf-8"?>
+<p:sld xmlns:a="http://schemas.openxmlformats.org/drawingml/2006/main" xmlns:r="http://schemas.openxmlformats.org/officeDocument/2006/relationships" xmlns:p="http://schemas.openxmlformats.org/presentationml/2006/main">
+  <p:cSld>
+    <p:spTree>
+      <p:nvGrpSpPr>
+        <p:cNvPr id="1" name=""/>
+        <p:cNvGrpSpPr/>
+        <p:nvPr/>
+      </p:nvGrpSpPr>
+      <p:grpSpPr>
+        <a:xfrm>
+          <a:off x="0" y="0"/>
+          <a:ext cx="0" cy="0"/>
+          <a:chOff x="0" y="0"/>
+          <a:chExt cx="0" cy="0"/>
+        </a:xfrm>
+      </p:grpSpPr>
+      <p:sp>
+        <p:nvSpPr>
+          <p:cNvPr id="2" name="Text Placeholder 1">
+            <a:extLst>
+              <a:ext uri="{FF2B5EF4-FFF2-40B4-BE49-F238E27FC236}">
+                <a16:creationId xmlns:a16="http://schemas.microsoft.com/office/drawing/2014/main" id="{8062580D-A863-E125-1190-2579A6D22DCE}"/>
+              </a:ext>
+            </a:extLst>
+          </p:cNvPr>
+          <p:cNvSpPr>
+            <a:spLocks noGrp="1"/>
+          </p:cNvSpPr>
+          <p:nvPr>
+            <p:ph type="body" sz="quarter" idx="15"/>
+          </p:nvPr>
+        </p:nvSpPr>
+        <p:spPr/>
+        <p:txBody>
+          <a:bodyPr/>
+          <a:lstStyle/>
+          <a:p>
+            <a:endParaRPr lang="en-US"/>
+          </a:p>
+        </p:txBody>
+      </p:sp>
+      <p:sp>
+        <p:nvSpPr>
+          <p:cNvPr id="3" name="Text Placeholder 2">
+            <a:extLst>
+              <a:ext uri="{FF2B5EF4-FFF2-40B4-BE49-F238E27FC236}">
+                <a16:creationId xmlns:a16="http://schemas.microsoft.com/office/drawing/2014/main" id="{89A9328A-F638-E2AA-83FE-D421DDB79A6F}"/>
+              </a:ext>
+            </a:extLst>
+          </p:cNvPr>
+          <p:cNvSpPr>
+            <a:spLocks noGrp="1"/>
+          </p:cNvSpPr>
+          <p:nvPr>
+            <p:ph type="body" sz="quarter" idx="17"/>
+          </p:nvPr>
+        </p:nvSpPr>
+        <p:spPr/>
+        <p:txBody>
+          <a:bodyPr/>
+          <a:lstStyle/>
+          <a:p>
+            <a:endParaRPr lang="en-US"/>
+          </a:p>
+        </p:txBody>
+      </p:sp>
+      <p:sp>
+        <p:nvSpPr>
+          <p:cNvPr id="4" name="Text Placeholder 3">
+            <a:extLst>
+              <a:ext uri="{FF2B5EF4-FFF2-40B4-BE49-F238E27FC236}">
+                <a16:creationId xmlns:a16="http://schemas.microsoft.com/office/drawing/2014/main" id="{6059488A-60A6-9C97-AD81-929BEC06B2E5}"/>
+              </a:ext>
+            </a:extLst>
+          </p:cNvPr>
+          <p:cNvSpPr>
+            <a:spLocks noGrp="1"/>
+          </p:cNvSpPr>
+          <p:nvPr>
+            <p:ph type="body" sz="quarter" idx="16"/>
+          </p:nvPr>
+        </p:nvSpPr>
+        <p:spPr/>
+        <p:txBody>
+          <a:bodyPr/>
+          <a:lstStyle/>
+          <a:p>
+            <a:endParaRPr lang="en-US"/>
+          </a:p>
+        </p:txBody>
+      </p:sp>
+      <p:sp>
+        <p:nvSpPr>
+          <p:cNvPr id="5" name="Title 4">
+            <a:extLst>
+              <a:ext uri="{FF2B5EF4-FFF2-40B4-BE49-F238E27FC236}">
+                <a16:creationId xmlns:a16="http://schemas.microsoft.com/office/drawing/2014/main" id="{B9900C7E-85E2-A13C-CE0C-68D1670164C2}"/>
+              </a:ext>
+            </a:extLst>
+          </p:cNvPr>
+          <p:cNvSpPr>
+            <a:spLocks noGrp="1"/>
+          </p:cNvSpPr>
+          <p:nvPr>
+            <p:ph type="title"/>
+          </p:nvPr>
+        </p:nvSpPr>
+        <p:spPr/>
+        <p:txBody>
+          <a:bodyPr/>
+          <a:lstStyle/>
+          <a:p>
+            <a:r>
+              <a:rPr lang="en-US" dirty="0"/>
+              <a:t>Looking at the Stages</a:t>
+            </a:r>
+          </a:p>
+        </p:txBody>
+      </p:sp>
+      <p:sp>
+        <p:nvSpPr>
+          <p:cNvPr id="6" name="Content Placeholder 5">
+            <a:extLst>
+              <a:ext uri="{FF2B5EF4-FFF2-40B4-BE49-F238E27FC236}">
+                <a16:creationId xmlns:a16="http://schemas.microsoft.com/office/drawing/2014/main" id="{82CE2ACA-F471-1A6B-EEB5-05DE0EC00C01}"/>
+              </a:ext>
+            </a:extLst>
+          </p:cNvPr>
+          <p:cNvSpPr>
+            <a:spLocks noGrp="1"/>
+          </p:cNvSpPr>
+          <p:nvPr>
+            <p:ph idx="1"/>
+          </p:nvPr>
+        </p:nvSpPr>
+        <p:spPr/>
+        <p:txBody>
+          <a:bodyPr/>
+          <a:lstStyle/>
+          <a:p>
+            <a:r>
+              <a:rPr lang="en-US" dirty="0">
+                <a:highlight>
+                  <a:srgbClr val="FFFF00"/>
+                </a:highlight>
+                <a:hlinkClick r:id="rId2"/>
+              </a:rPr>
+              <a:t>https://www.protechtraining.com/blog/post/tuning-apache-spark-jobs-the-easy-way-web-ui-stage-detail-view-911</a:t>
+            </a:r>
+            <a:endParaRPr lang="en-US" dirty="0">
+              <a:highlight>
+                <a:srgbClr val="FFFF00"/>
+              </a:highlight>
+            </a:endParaRPr>
+          </a:p>
+          <a:p>
+            <a:r>
+              <a:rPr lang="en-US" dirty="0">
+                <a:highlight>
+                  <a:srgbClr val="FFFF00"/>
+                </a:highlight>
+              </a:rPr>
+              <a:t>????</a:t>
+            </a:r>
+          </a:p>
+        </p:txBody>
+      </p:sp>
+    </p:spTree>
+    <p:extLst>
+      <p:ext uri="{BB962C8B-B14F-4D97-AF65-F5344CB8AC3E}">
+        <p14:creationId xmlns:p14="http://schemas.microsoft.com/office/powerpoint/2010/main" val="2611348108"/>
+      </p:ext>
+    </p:extLst>
+  </p:cSld>
+  <p:clrMapOvr>
+    <a:masterClrMapping/>
+  </p:clrMapOvr>
+</p:sld>
+</file>
+
+<file path=ppt/slides/slide12.xml><?xml version="1.0" encoding="utf-8"?>
+<p:sld xmlns:a="http://schemas.openxmlformats.org/drawingml/2006/main" xmlns:r="http://schemas.openxmlformats.org/officeDocument/2006/relationships" xmlns:p="http://schemas.openxmlformats.org/presentationml/2006/main">
+  <p:cSld>
+    <p:spTree>
+      <p:nvGrpSpPr>
+        <p:cNvPr id="1" name=""/>
+        <p:cNvGrpSpPr/>
+        <p:nvPr/>
+      </p:nvGrpSpPr>
+      <p:grpSpPr>
+        <a:xfrm>
+          <a:off x="0" y="0"/>
+          <a:ext cx="0" cy="0"/>
+          <a:chOff x="0" y="0"/>
+          <a:chExt cx="0" cy="0"/>
+        </a:xfrm>
+      </p:grpSpPr>
+      <p:sp>
+        <p:nvSpPr>
+          <p:cNvPr id="2" name="Text Placeholder 1">
+            <a:extLst>
+              <a:ext uri="{FF2B5EF4-FFF2-40B4-BE49-F238E27FC236}">
+                <a16:creationId xmlns:a16="http://schemas.microsoft.com/office/drawing/2014/main" id="{77BE6730-C453-78AF-BFFC-C4CBF002870B}"/>
+              </a:ext>
+            </a:extLst>
+          </p:cNvPr>
+          <p:cNvSpPr>
+            <a:spLocks noGrp="1"/>
+          </p:cNvSpPr>
+          <p:nvPr>
+            <p:ph type="body" sz="quarter" idx="15"/>
+          </p:nvPr>
+        </p:nvSpPr>
+        <p:spPr/>
+        <p:txBody>
+          <a:bodyPr/>
+          <a:lstStyle/>
+          <a:p>
+            <a:endParaRPr lang="en-US"/>
+          </a:p>
+        </p:txBody>
+      </p:sp>
+      <p:sp>
+        <p:nvSpPr>
+          <p:cNvPr id="3" name="Text Placeholder 2">
+            <a:extLst>
+              <a:ext uri="{FF2B5EF4-FFF2-40B4-BE49-F238E27FC236}">
+                <a16:creationId xmlns:a16="http://schemas.microsoft.com/office/drawing/2014/main" id="{C20E2107-1A40-1234-2620-0414A75DC1D0}"/>
+              </a:ext>
+            </a:extLst>
+          </p:cNvPr>
+          <p:cNvSpPr>
+            <a:spLocks noGrp="1"/>
+          </p:cNvSpPr>
+          <p:nvPr>
+            <p:ph type="body" sz="quarter" idx="17"/>
+          </p:nvPr>
+        </p:nvSpPr>
+        <p:spPr/>
+        <p:txBody>
+          <a:bodyPr/>
+          <a:lstStyle/>
+          <a:p>
+            <a:endParaRPr lang="en-US"/>
+          </a:p>
+        </p:txBody>
+      </p:sp>
+      <p:sp>
+        <p:nvSpPr>
+          <p:cNvPr id="4" name="Text Placeholder 3">
+            <a:extLst>
+              <a:ext uri="{FF2B5EF4-FFF2-40B4-BE49-F238E27FC236}">
+                <a16:creationId xmlns:a16="http://schemas.microsoft.com/office/drawing/2014/main" id="{9FE819F6-E0A6-7C58-BE90-059D26D52AB8}"/>
+              </a:ext>
+            </a:extLst>
+          </p:cNvPr>
+          <p:cNvSpPr>
+            <a:spLocks noGrp="1"/>
+          </p:cNvSpPr>
+          <p:nvPr>
+            <p:ph type="body" sz="quarter" idx="16"/>
+          </p:nvPr>
+        </p:nvSpPr>
+        <p:spPr/>
+        <p:txBody>
+          <a:bodyPr/>
+          <a:lstStyle/>
+          <a:p>
+            <a:endParaRPr lang="en-US"/>
+          </a:p>
+        </p:txBody>
+      </p:sp>
+      <p:sp>
+        <p:nvSpPr>
+          <p:cNvPr id="5" name="Title 4">
+            <a:extLst>
+              <a:ext uri="{FF2B5EF4-FFF2-40B4-BE49-F238E27FC236}">
+                <a16:creationId xmlns:a16="http://schemas.microsoft.com/office/drawing/2014/main" id="{920350B5-D9C9-CB49-D452-CA19A07B0B22}"/>
+              </a:ext>
+            </a:extLst>
+          </p:cNvPr>
+          <p:cNvSpPr>
+            <a:spLocks noGrp="1"/>
+          </p:cNvSpPr>
+          <p:nvPr>
+            <p:ph type="title"/>
+          </p:nvPr>
+        </p:nvSpPr>
+        <p:spPr/>
+        <p:txBody>
+          <a:bodyPr/>
+          <a:lstStyle/>
+          <a:p>
+            <a:r>
+              <a:rPr lang="en-US" dirty="0" err="1"/>
+              <a:t>Dataframes</a:t>
+            </a:r>
+            <a:r>
+              <a:rPr lang="en-US" dirty="0"/>
+              <a:t> behind the scene</a:t>
+            </a:r>
+          </a:p>
+        </p:txBody>
+      </p:sp>
+      <p:sp>
+        <p:nvSpPr>
+          <p:cNvPr id="6" name="Content Placeholder 5">
+            <a:extLst>
+              <a:ext uri="{FF2B5EF4-FFF2-40B4-BE49-F238E27FC236}">
+                <a16:creationId xmlns:a16="http://schemas.microsoft.com/office/drawing/2014/main" id="{02A47CE1-7014-8961-A712-C0F1A2B9FADD}"/>
+              </a:ext>
+            </a:extLst>
+          </p:cNvPr>
+          <p:cNvSpPr>
+            <a:spLocks noGrp="1"/>
+          </p:cNvSpPr>
+          <p:nvPr>
+            <p:ph idx="1"/>
+          </p:nvPr>
+        </p:nvSpPr>
+        <p:spPr>
+          <a:xfrm>
+            <a:off x="893763" y="8293666"/>
+            <a:ext cx="11217275" cy="491559"/>
+          </a:xfrm>
+        </p:spPr>
+        <p:txBody>
+          <a:bodyPr anchor="ctr">
+            <a:normAutofit/>
+          </a:bodyPr>
+          <a:lstStyle/>
+          <a:p>
+            <a:pPr marL="0" indent="0">
+              <a:buNone/>
+            </a:pPr>
+            <a:r>
+              <a:rPr lang="en-US" sz="1800" dirty="0"/>
+              <a:t>Ref: </a:t>
+            </a:r>
+            <a:r>
+              <a:rPr lang="en-US" sz="1800" dirty="0">
+                <a:hlinkClick r:id="rId2"/>
+              </a:rPr>
+              <a:t>Spark APIs</a:t>
+            </a:r>
+            <a:endParaRPr lang="en-US" sz="1800" dirty="0"/>
+          </a:p>
+        </p:txBody>
+      </p:sp>
+      <p:pic>
+        <p:nvPicPr>
+          <p:cNvPr id="8" name="Picture 7">
+            <a:extLst>
+              <a:ext uri="{FF2B5EF4-FFF2-40B4-BE49-F238E27FC236}">
+                <a16:creationId xmlns:a16="http://schemas.microsoft.com/office/drawing/2014/main" id="{E8BE5E09-535A-BBAC-0612-CCD098AD4560}"/>
+              </a:ext>
+            </a:extLst>
+          </p:cNvPr>
+          <p:cNvPicPr>
+            <a:picLocks noChangeAspect="1"/>
+          </p:cNvPicPr>
+          <p:nvPr/>
+        </p:nvPicPr>
+        <p:blipFill>
+          <a:blip r:embed="rId3"/>
+          <a:stretch>
+            <a:fillRect/>
+          </a:stretch>
+        </p:blipFill>
+        <p:spPr>
+          <a:xfrm>
+            <a:off x="0" y="3245973"/>
+            <a:ext cx="13004800" cy="3261654"/>
+          </a:xfrm>
+          <a:prstGeom prst="rect">
+            <a:avLst/>
+          </a:prstGeom>
+        </p:spPr>
+      </p:pic>
+      <p:sp>
+        <p:nvSpPr>
+          <p:cNvPr id="7" name="Speech Bubble: Rectangle 6">
+            <a:extLst>
+              <a:ext uri="{FF2B5EF4-FFF2-40B4-BE49-F238E27FC236}">
+                <a16:creationId xmlns:a16="http://schemas.microsoft.com/office/drawing/2014/main" id="{119FA4AA-68FD-4006-F1BD-E52E4FCF9925}"/>
+              </a:ext>
+            </a:extLst>
+          </p:cNvPr>
+          <p:cNvSpPr/>
+          <p:nvPr/>
+        </p:nvSpPr>
+        <p:spPr>
+          <a:xfrm>
+            <a:off x="6325744" y="5744001"/>
+            <a:ext cx="1453487" cy="570081"/>
+          </a:xfrm>
+          <a:prstGeom prst="wedgeRectCallout">
+            <a:avLst>
+              <a:gd name="adj1" fmla="val -45246"/>
+              <a:gd name="adj2" fmla="val -98310"/>
+            </a:avLst>
+          </a:prstGeom>
+          <a:solidFill>
+            <a:schemeClr val="bg1"/>
+          </a:solidFill>
+        </p:spPr>
+        <p:style>
+          <a:lnRef idx="2">
+            <a:schemeClr val="accent1">
+              <a:shade val="50000"/>
+            </a:schemeClr>
+          </a:lnRef>
+          <a:fillRef idx="1">
+            <a:schemeClr val="accent1"/>
+          </a:fillRef>
+          <a:effectRef idx="0">
+            <a:schemeClr val="accent1"/>
+          </a:effectRef>
+          <a:fontRef idx="minor">
+            <a:schemeClr val="lt1"/>
+          </a:fontRef>
+        </p:style>
+        <p:txBody>
+          <a:bodyPr rtlCol="0" anchor="ctr"/>
+          <a:lstStyle/>
+          <a:p>
+            <a:pPr algn="ctr"/>
+            <a:r>
+              <a:rPr lang="en-US" b="0" dirty="0" err="1">
+                <a:solidFill>
+                  <a:schemeClr val="tx1"/>
+                </a:solidFill>
+                <a:latin typeface="Avenir Black"/>
+              </a:rPr>
+              <a:t>Eg</a:t>
+            </a:r>
+            <a:r>
+              <a:rPr lang="en-US" b="0" dirty="0">
+                <a:solidFill>
+                  <a:schemeClr val="tx1"/>
+                </a:solidFill>
+                <a:latin typeface="Avenir Black"/>
+              </a:rPr>
+              <a:t> filters first</a:t>
+            </a:r>
+          </a:p>
+        </p:txBody>
+      </p:sp>
+      <p:sp>
+        <p:nvSpPr>
+          <p:cNvPr id="9" name="Speech Bubble: Rectangle 8">
+            <a:extLst>
+              <a:ext uri="{FF2B5EF4-FFF2-40B4-BE49-F238E27FC236}">
+                <a16:creationId xmlns:a16="http://schemas.microsoft.com/office/drawing/2014/main" id="{5C01638E-4767-D9FB-D25C-2D59BA4BA3CE}"/>
+              </a:ext>
+            </a:extLst>
+          </p:cNvPr>
+          <p:cNvSpPr/>
+          <p:nvPr/>
+        </p:nvSpPr>
+        <p:spPr>
+          <a:xfrm>
+            <a:off x="9059630" y="3013042"/>
+            <a:ext cx="1758720" cy="570081"/>
+          </a:xfrm>
+          <a:prstGeom prst="wedgeRectCallout">
+            <a:avLst>
+              <a:gd name="adj1" fmla="val -37265"/>
+              <a:gd name="adj2" fmla="val 93210"/>
+            </a:avLst>
+          </a:prstGeom>
+          <a:solidFill>
+            <a:schemeClr val="bg1"/>
+          </a:solidFill>
+        </p:spPr>
+        <p:style>
+          <a:lnRef idx="2">
+            <a:schemeClr val="accent1">
+              <a:shade val="50000"/>
+            </a:schemeClr>
+          </a:lnRef>
+          <a:fillRef idx="1">
+            <a:schemeClr val="accent1"/>
+          </a:fillRef>
+          <a:effectRef idx="0">
+            <a:schemeClr val="accent1"/>
+          </a:effectRef>
+          <a:fontRef idx="minor">
+            <a:schemeClr val="lt1"/>
+          </a:fontRef>
+        </p:style>
+        <p:txBody>
+          <a:bodyPr rtlCol="0" anchor="ctr"/>
+          <a:lstStyle/>
+          <a:p>
+            <a:pPr algn="ctr"/>
+            <a:r>
+              <a:rPr lang="en-US" b="0" dirty="0">
+                <a:solidFill>
+                  <a:schemeClr val="tx1"/>
+                </a:solidFill>
+                <a:latin typeface="Avenir Black"/>
+              </a:rPr>
+              <a:t>Most efficient?</a:t>
+            </a:r>
+          </a:p>
+        </p:txBody>
+      </p:sp>
+      <p:sp>
+        <p:nvSpPr>
+          <p:cNvPr id="10" name="TextBox 9">
+            <a:extLst>
+              <a:ext uri="{FF2B5EF4-FFF2-40B4-BE49-F238E27FC236}">
+                <a16:creationId xmlns:a16="http://schemas.microsoft.com/office/drawing/2014/main" id="{C0ABBF26-9148-3B52-24A5-690DC5776026}"/>
+              </a:ext>
+            </a:extLst>
+          </p:cNvPr>
+          <p:cNvSpPr txBox="1"/>
+          <p:nvPr/>
+        </p:nvSpPr>
+        <p:spPr>
+          <a:xfrm flipH="1">
+            <a:off x="2925397" y="2306472"/>
+            <a:ext cx="4533104" cy="369332"/>
+          </a:xfrm>
+          <a:prstGeom prst="rect">
+            <a:avLst/>
+          </a:prstGeom>
+          <a:noFill/>
+        </p:spPr>
+        <p:txBody>
+          <a:bodyPr wrap="square" rtlCol="0">
+            <a:spAutoFit/>
+          </a:bodyPr>
+          <a:lstStyle/>
+          <a:p>
+            <a:r>
+              <a:rPr lang="en-US" dirty="0" err="1">
+                <a:highlight>
+                  <a:srgbClr val="FFFF00"/>
+                </a:highlight>
+              </a:rPr>
+              <a:t>Spostare</a:t>
+            </a:r>
+            <a:r>
+              <a:rPr lang="en-US" dirty="0">
+                <a:highlight>
+                  <a:srgbClr val="FFFF00"/>
+                </a:highlight>
+              </a:rPr>
+              <a:t> in </a:t>
+            </a:r>
+            <a:r>
+              <a:rPr lang="en-US" dirty="0" err="1">
+                <a:highlight>
+                  <a:srgbClr val="FFFF00"/>
+                </a:highlight>
+              </a:rPr>
+              <a:t>altro</a:t>
+            </a:r>
+            <a:r>
+              <a:rPr lang="en-US" dirty="0">
+                <a:highlight>
+                  <a:srgbClr val="FFFF00"/>
+                </a:highlight>
+              </a:rPr>
+              <a:t> set di slide?</a:t>
+            </a:r>
+          </a:p>
+        </p:txBody>
+      </p:sp>
+    </p:spTree>
+    <p:extLst>
+      <p:ext uri="{BB962C8B-B14F-4D97-AF65-F5344CB8AC3E}">
+        <p14:creationId xmlns:p14="http://schemas.microsoft.com/office/powerpoint/2010/main" val="2596552061"/>
+      </p:ext>
+    </p:extLst>
+  </p:cSld>
+  <p:clrMapOvr>
+    <a:masterClrMapping/>
+  </p:clrMapOvr>
+</p:sld>
+</file>
+
 <file path=ppt/slides/slide2.xml><?xml version="1.0" encoding="utf-8"?>
 <p:sld xmlns:a="http://schemas.openxmlformats.org/drawingml/2006/main" xmlns:r="http://schemas.openxmlformats.org/officeDocument/2006/relationships" xmlns:p="http://schemas.openxmlformats.org/presentationml/2006/main">
   <p:cSld>
@@ -2961,32 +3888,21 @@
           <a:p>
             <a:r>
               <a:rPr lang="en-US" dirty="0"/>
-              <a:t>Application</a:t>
-            </a:r>
-          </a:p>
-          <a:p>
+              <a:t>Clusters, nodes, executors</a:t>
+            </a:r>
+          </a:p>
+          <a:p>
+            <a:r>
+              <a:rPr lang="en-US" dirty="0"/>
+              <a:t>Application, Driver, </a:t>
+            </a:r>
             <a:r>
               <a:rPr lang="en-US" dirty="0" err="1"/>
               <a:t>SparkSession</a:t>
             </a:r>
-            <a:endParaRPr lang="en-US" dirty="0"/>
-          </a:p>
-          <a:p>
             <a:r>
               <a:rPr lang="en-US" dirty="0"/>
-              <a:t>Job</a:t>
-            </a:r>
-          </a:p>
-          <a:p>
-            <a:r>
-              <a:rPr lang="en-US" dirty="0"/>
-              <a:t>Stage</a:t>
-            </a:r>
-          </a:p>
-          <a:p>
-            <a:r>
-              <a:rPr lang="en-US" dirty="0"/>
-              <a:t>Task</a:t>
+              <a:t>, Job, Stage, Task</a:t>
             </a:r>
           </a:p>
         </p:txBody>
@@ -3662,7 +4578,7 @@
         </p:blipFill>
         <p:spPr>
           <a:xfrm>
-            <a:off x="4145667" y="330521"/>
+            <a:off x="4145667" y="255458"/>
             <a:ext cx="7589297" cy="4456632"/>
           </a:xfrm>
           <a:prstGeom prst="rect">
@@ -4050,7 +4966,7 @@
           <p:cNvPr id="2" name="Text Placeholder 1">
             <a:extLst>
               <a:ext uri="{FF2B5EF4-FFF2-40B4-BE49-F238E27FC236}">
-                <a16:creationId xmlns:a16="http://schemas.microsoft.com/office/drawing/2014/main" id="{DF23A3A6-27E3-D481-AFE5-545F9D45C5F8}"/>
+                <a16:creationId xmlns:a16="http://schemas.microsoft.com/office/drawing/2014/main" id="{96F76C5C-28AA-F534-024E-14A4214D08FB}"/>
               </a:ext>
             </a:extLst>
           </p:cNvPr>
@@ -4075,7 +4991,7 @@
           <p:cNvPr id="3" name="Text Placeholder 2">
             <a:extLst>
               <a:ext uri="{FF2B5EF4-FFF2-40B4-BE49-F238E27FC236}">
-                <a16:creationId xmlns:a16="http://schemas.microsoft.com/office/drawing/2014/main" id="{CF6AED50-69CF-1654-42B4-A67A9602D1A6}"/>
+                <a16:creationId xmlns:a16="http://schemas.microsoft.com/office/drawing/2014/main" id="{7AFA8F68-2E5D-DB5B-9F57-84AAAE8DEEFF}"/>
               </a:ext>
             </a:extLst>
           </p:cNvPr>
@@ -4100,7 +5016,7 @@
           <p:cNvPr id="4" name="Text Placeholder 3">
             <a:extLst>
               <a:ext uri="{FF2B5EF4-FFF2-40B4-BE49-F238E27FC236}">
-                <a16:creationId xmlns:a16="http://schemas.microsoft.com/office/drawing/2014/main" id="{B10C2239-60BE-DB50-BFAA-EF17B16CDB89}"/>
+                <a16:creationId xmlns:a16="http://schemas.microsoft.com/office/drawing/2014/main" id="{B63FAB5B-C5FF-D564-5B61-8C829B813320}"/>
               </a:ext>
             </a:extLst>
           </p:cNvPr>
@@ -4125,7 +5041,7 @@
           <p:cNvPr id="5" name="Title 4">
             <a:extLst>
               <a:ext uri="{FF2B5EF4-FFF2-40B4-BE49-F238E27FC236}">
-                <a16:creationId xmlns:a16="http://schemas.microsoft.com/office/drawing/2014/main" id="{100C9747-D1DC-DA24-55E0-FDC36BD446AA}"/>
+                <a16:creationId xmlns:a16="http://schemas.microsoft.com/office/drawing/2014/main" id="{D465338D-E88D-C0ED-8C60-015D63F1A727}"/>
               </a:ext>
             </a:extLst>
           </p:cNvPr>
@@ -4143,108 +5059,309 @@
           <a:p>
             <a:r>
               <a:rPr lang="en-US" dirty="0"/>
-              <a:t>Spark Driver</a:t>
-            </a:r>
-          </a:p>
-        </p:txBody>
-      </p:sp>
-      <p:sp>
-        <p:nvSpPr>
-          <p:cNvPr id="6" name="Content Placeholder 5">
-            <a:extLst>
-              <a:ext uri="{FF2B5EF4-FFF2-40B4-BE49-F238E27FC236}">
-                <a16:creationId xmlns:a16="http://schemas.microsoft.com/office/drawing/2014/main" id="{9701087B-8123-26B0-C6E1-6B8E1B6A7E8C}"/>
-              </a:ext>
-            </a:extLst>
-          </p:cNvPr>
-          <p:cNvSpPr>
-            <a:spLocks noGrp="1"/>
-          </p:cNvSpPr>
-          <p:nvPr>
-            <p:ph idx="1"/>
-          </p:nvPr>
-        </p:nvSpPr>
-        <p:spPr/>
-        <p:txBody>
-          <a:bodyPr/>
-          <a:lstStyle/>
-          <a:p>
-            <a:r>
-              <a:rPr lang="en-US" dirty="0">
-                <a:hlinkClick r:id="rId2"/>
-              </a:rPr>
-              <a:t>https://blog.knoldus.com/understanding-the-working-of-spark-driver-and-executor/</a:t>
-            </a:r>
-            <a:r>
-              <a:rPr lang="en-US" dirty="0"/>
-              <a:t> </a:t>
-            </a:r>
-          </a:p>
-          <a:p>
-            <a:r>
-              <a:rPr lang="en-US" dirty="0">
-                <a:hlinkClick r:id="rId3"/>
-              </a:rPr>
-              <a:t>https://spark.apache.org/docs/latest/cluster-overview.html</a:t>
-            </a:r>
-            <a:r>
-              <a:rPr lang="en-US" dirty="0"/>
-              <a:t> </a:t>
-            </a:r>
-          </a:p>
-        </p:txBody>
-      </p:sp>
-      <p:pic>
-        <p:nvPicPr>
-          <p:cNvPr id="1026" name="Picture 2">
-            <a:extLst>
-              <a:ext uri="{FF2B5EF4-FFF2-40B4-BE49-F238E27FC236}">
-                <a16:creationId xmlns:a16="http://schemas.microsoft.com/office/drawing/2014/main" id="{06BD8CD8-B173-F227-63CE-D19A97846868}"/>
-              </a:ext>
-            </a:extLst>
-          </p:cNvPr>
-          <p:cNvPicPr>
-            <a:picLocks noChangeAspect="1" noChangeArrowheads="1"/>
-          </p:cNvPicPr>
+              <a:t>Applications and Processes</a:t>
+            </a:r>
+          </a:p>
+        </p:txBody>
+      </p:sp>
+      <p:sp>
+        <p:nvSpPr>
+          <p:cNvPr id="8" name="TextBox 7">
+            <a:extLst>
+              <a:ext uri="{FF2B5EF4-FFF2-40B4-BE49-F238E27FC236}">
+                <a16:creationId xmlns:a16="http://schemas.microsoft.com/office/drawing/2014/main" id="{4014B9F8-1748-F97F-23EB-A297DFC21389}"/>
+              </a:ext>
+            </a:extLst>
+          </p:cNvPr>
+          <p:cNvSpPr txBox="1"/>
           <p:nvPr/>
-        </p:nvPicPr>
-        <p:blipFill>
-          <a:blip r:embed="rId4">
-            <a:extLst>
-              <a:ext uri="{28A0092B-C50C-407E-A947-70E740481C1C}">
-                <a14:useLocalDpi xmlns:a14="http://schemas.microsoft.com/office/drawing/2010/main" val="0"/>
-              </a:ext>
-            </a:extLst>
-          </a:blip>
-          <a:srcRect/>
-          <a:stretch>
-            <a:fillRect/>
-          </a:stretch>
-        </p:blipFill>
-        <p:spPr bwMode="auto">
+        </p:nvSpPr>
+        <p:spPr>
           <a:xfrm>
-            <a:off x="3663950" y="4572560"/>
-            <a:ext cx="5676900" cy="2724150"/>
+            <a:off x="419662" y="8455765"/>
+            <a:ext cx="6503158" cy="276999"/>
           </a:xfrm>
           <a:prstGeom prst="rect">
             <a:avLst/>
           </a:prstGeom>
           <a:noFill/>
-          <a:extLst>
-            <a:ext uri="{909E8E84-426E-40DD-AFC4-6F175D3DCCD1}">
-              <a14:hiddenFill xmlns:a14="http://schemas.microsoft.com/office/drawing/2010/main">
-                <a:solidFill>
-                  <a:srgbClr val="FFFFFF"/>
-                </a:solidFill>
-              </a14:hiddenFill>
-            </a:ext>
-          </a:extLst>
         </p:spPr>
-      </p:pic>
+        <p:txBody>
+          <a:bodyPr wrap="square">
+            <a:spAutoFit/>
+          </a:bodyPr>
+          <a:lstStyle/>
+          <a:p>
+            <a:pPr algn="l"/>
+            <a:r>
+              <a:rPr lang="en-US" sz="1200" b="0" dirty="0">
+                <a:latin typeface="Avenir Black"/>
+              </a:rPr>
+              <a:t>Ref: </a:t>
+            </a:r>
+            <a:r>
+              <a:rPr lang="en-US" sz="1200" b="0" dirty="0">
+                <a:latin typeface="Avenir Black"/>
+                <a:hlinkClick r:id="rId3"/>
+              </a:rPr>
+              <a:t>Cluster Overview</a:t>
+            </a:r>
+            <a:endParaRPr lang="en-US" sz="1200" b="0" dirty="0">
+              <a:latin typeface="Avenir Black"/>
+            </a:endParaRPr>
+          </a:p>
+        </p:txBody>
+      </p:sp>
+      <p:grpSp>
+        <p:nvGrpSpPr>
+          <p:cNvPr id="13" name="Group 12">
+            <a:extLst>
+              <a:ext uri="{FF2B5EF4-FFF2-40B4-BE49-F238E27FC236}">
+                <a16:creationId xmlns:a16="http://schemas.microsoft.com/office/drawing/2014/main" id="{8214DA3D-4639-598B-3783-9C973681C870}"/>
+              </a:ext>
+            </a:extLst>
+          </p:cNvPr>
+          <p:cNvGrpSpPr/>
+          <p:nvPr/>
+        </p:nvGrpSpPr>
+        <p:grpSpPr>
+          <a:xfrm>
+            <a:off x="3210796" y="2405063"/>
+            <a:ext cx="4657139" cy="2873480"/>
+            <a:chOff x="2903721" y="1321471"/>
+            <a:chExt cx="7589297" cy="4682638"/>
+          </a:xfrm>
+        </p:grpSpPr>
+        <p:pic>
+          <p:nvPicPr>
+            <p:cNvPr id="9" name="Picture 8">
+              <a:extLst>
+                <a:ext uri="{FF2B5EF4-FFF2-40B4-BE49-F238E27FC236}">
+                  <a16:creationId xmlns:a16="http://schemas.microsoft.com/office/drawing/2014/main" id="{0371ABC0-174C-DC46-5EDB-5617C4F4FE83}"/>
+                </a:ext>
+              </a:extLst>
+            </p:cNvPr>
+            <p:cNvPicPr>
+              <a:picLocks noChangeAspect="1"/>
+            </p:cNvPicPr>
+            <p:nvPr/>
+          </p:nvPicPr>
+          <p:blipFill>
+            <a:blip r:embed="rId4"/>
+            <a:stretch>
+              <a:fillRect/>
+            </a:stretch>
+          </p:blipFill>
+          <p:spPr>
+            <a:xfrm>
+              <a:off x="2903721" y="1321471"/>
+              <a:ext cx="7589297" cy="4456632"/>
+            </a:xfrm>
+            <a:prstGeom prst="rect">
+              <a:avLst/>
+            </a:prstGeom>
+          </p:spPr>
+        </p:pic>
+        <p:sp>
+          <p:nvSpPr>
+            <p:cNvPr id="10" name="Rectangle 9">
+              <a:extLst>
+                <a:ext uri="{FF2B5EF4-FFF2-40B4-BE49-F238E27FC236}">
+                  <a16:creationId xmlns:a16="http://schemas.microsoft.com/office/drawing/2014/main" id="{8BC6A5A3-3A66-C6D4-4EED-56366A68FC04}"/>
+                </a:ext>
+              </a:extLst>
+            </p:cNvPr>
+            <p:cNvSpPr/>
+            <p:nvPr/>
+          </p:nvSpPr>
+          <p:spPr>
+            <a:xfrm>
+              <a:off x="3548418" y="4707572"/>
+              <a:ext cx="1549021" cy="1296537"/>
+            </a:xfrm>
+            <a:prstGeom prst="rect">
+              <a:avLst/>
+            </a:prstGeom>
+          </p:spPr>
+          <p:style>
+            <a:lnRef idx="2">
+              <a:schemeClr val="accent1">
+                <a:shade val="50000"/>
+              </a:schemeClr>
+            </a:lnRef>
+            <a:fillRef idx="1">
+              <a:schemeClr val="accent1"/>
+            </a:fillRef>
+            <a:effectRef idx="0">
+              <a:schemeClr val="accent1"/>
+            </a:effectRef>
+            <a:fontRef idx="minor">
+              <a:schemeClr val="lt1"/>
+            </a:fontRef>
+          </p:style>
+          <p:txBody>
+            <a:bodyPr rtlCol="0" anchor="ctr"/>
+            <a:lstStyle/>
+            <a:p>
+              <a:pPr algn="ctr"/>
+              <a:r>
+                <a:rPr lang="en-US" dirty="0"/>
+                <a:t>Application 2</a:t>
+              </a:r>
+            </a:p>
+          </p:txBody>
+        </p:sp>
+        <p:sp>
+          <p:nvSpPr>
+            <p:cNvPr id="11" name="Rectangle 10">
+              <a:extLst>
+                <a:ext uri="{FF2B5EF4-FFF2-40B4-BE49-F238E27FC236}">
+                  <a16:creationId xmlns:a16="http://schemas.microsoft.com/office/drawing/2014/main" id="{6F2A5EBE-63A9-DEF6-19EE-A772F181EF5C}"/>
+                </a:ext>
+              </a:extLst>
+            </p:cNvPr>
+            <p:cNvSpPr/>
+            <p:nvPr/>
+          </p:nvSpPr>
+          <p:spPr>
+            <a:xfrm>
+              <a:off x="7306317" y="3579527"/>
+              <a:ext cx="1280183" cy="604844"/>
+            </a:xfrm>
+            <a:prstGeom prst="rect">
+              <a:avLst/>
+            </a:prstGeom>
+          </p:spPr>
+          <p:style>
+            <a:lnRef idx="2">
+              <a:schemeClr val="accent1">
+                <a:shade val="50000"/>
+              </a:schemeClr>
+            </a:lnRef>
+            <a:fillRef idx="1">
+              <a:schemeClr val="accent1"/>
+            </a:fillRef>
+            <a:effectRef idx="0">
+              <a:schemeClr val="accent1"/>
+            </a:effectRef>
+            <a:fontRef idx="minor">
+              <a:schemeClr val="lt1"/>
+            </a:fontRef>
+          </p:style>
+          <p:txBody>
+            <a:bodyPr rtlCol="0" anchor="ctr"/>
+            <a:lstStyle/>
+            <a:p>
+              <a:pPr algn="ctr"/>
+              <a:r>
+                <a:rPr lang="en-US" dirty="0"/>
+                <a:t>Executor 2</a:t>
+              </a:r>
+            </a:p>
+          </p:txBody>
+        </p:sp>
+      </p:grpSp>
+      <p:sp>
+        <p:nvSpPr>
+          <p:cNvPr id="6" name="Content Placeholder 5">
+            <a:extLst>
+              <a:ext uri="{FF2B5EF4-FFF2-40B4-BE49-F238E27FC236}">
+                <a16:creationId xmlns:a16="http://schemas.microsoft.com/office/drawing/2014/main" id="{48A40678-4E05-767E-BE52-874A840467BF}"/>
+              </a:ext>
+            </a:extLst>
+          </p:cNvPr>
+          <p:cNvSpPr>
+            <a:spLocks noGrp="1"/>
+          </p:cNvSpPr>
+          <p:nvPr>
+            <p:ph idx="1"/>
+          </p:nvPr>
+        </p:nvSpPr>
+        <p:spPr>
+          <a:xfrm>
+            <a:off x="893763" y="5717040"/>
+            <a:ext cx="11402869" cy="2718795"/>
+          </a:xfrm>
+        </p:spPr>
+        <p:txBody>
+          <a:bodyPr>
+            <a:normAutofit/>
+          </a:bodyPr>
+          <a:lstStyle/>
+          <a:p>
+            <a:pPr marL="0" indent="0">
+              <a:buNone/>
+            </a:pPr>
+            <a:r>
+              <a:rPr lang="en-US" dirty="0"/>
+              <a:t>Each application gets its own executor processes</a:t>
+            </a:r>
+          </a:p>
+          <a:p>
+            <a:pPr marL="0" indent="0">
+              <a:buNone/>
+            </a:pPr>
+            <a:endParaRPr lang="en-US" dirty="0"/>
+          </a:p>
+          <a:p>
+            <a:pPr marL="0" indent="0">
+              <a:buNone/>
+            </a:pPr>
+            <a:r>
+              <a:rPr lang="en-US" dirty="0"/>
+              <a:t>Why? Isolating applications from each other, on both the scheduling side (each driver schedules its own tasks) and executor side (tasks from different applications run in different JVMs)</a:t>
+            </a:r>
+          </a:p>
+        </p:txBody>
+      </p:sp>
+      <p:sp>
+        <p:nvSpPr>
+          <p:cNvPr id="14" name="TextBox 13">
+            <a:extLst>
+              <a:ext uri="{FF2B5EF4-FFF2-40B4-BE49-F238E27FC236}">
+                <a16:creationId xmlns:a16="http://schemas.microsoft.com/office/drawing/2014/main" id="{1255DCEA-D707-4527-40B0-4EDBD5355DE2}"/>
+              </a:ext>
+            </a:extLst>
+          </p:cNvPr>
+          <p:cNvSpPr txBox="1"/>
+          <p:nvPr/>
+        </p:nvSpPr>
+        <p:spPr>
+          <a:xfrm>
+            <a:off x="6516806" y="3262860"/>
+            <a:ext cx="1351129" cy="369332"/>
+          </a:xfrm>
+          <a:prstGeom prst="rect">
+            <a:avLst/>
+          </a:prstGeom>
+          <a:noFill/>
+        </p:spPr>
+        <p:txBody>
+          <a:bodyPr wrap="square" rtlCol="0">
+            <a:spAutoFit/>
+          </a:bodyPr>
+          <a:lstStyle/>
+          <a:p>
+            <a:r>
+              <a:rPr lang="en-US" dirty="0" err="1">
+                <a:highlight>
+                  <a:srgbClr val="FFFF00"/>
+                </a:highlight>
+              </a:rPr>
+              <a:t>rifare</a:t>
+            </a:r>
+            <a:endParaRPr lang="en-US" dirty="0">
+              <a:highlight>
+                <a:srgbClr val="FFFF00"/>
+              </a:highlight>
+            </a:endParaRPr>
+          </a:p>
+        </p:txBody>
+      </p:sp>
     </p:spTree>
     <p:extLst>
       <p:ext uri="{BB962C8B-B14F-4D97-AF65-F5344CB8AC3E}">
-        <p14:creationId xmlns:p14="http://schemas.microsoft.com/office/powerpoint/2010/main" val="2063389975"/>
+        <p14:creationId xmlns:p14="http://schemas.microsoft.com/office/powerpoint/2010/main" val="1792458473"/>
       </p:ext>
     </p:extLst>
   </p:cSld>
@@ -4276,7 +5393,7 @@
           <p:cNvPr id="2" name="Text Placeholder 1">
             <a:extLst>
               <a:ext uri="{FF2B5EF4-FFF2-40B4-BE49-F238E27FC236}">
-                <a16:creationId xmlns:a16="http://schemas.microsoft.com/office/drawing/2014/main" id="{77BE6730-C453-78AF-BFFC-C4CBF002870B}"/>
+                <a16:creationId xmlns:a16="http://schemas.microsoft.com/office/drawing/2014/main" id="{F29E16DD-BF30-BD89-4FF6-8C9E304CAC9D}"/>
               </a:ext>
             </a:extLst>
           </p:cNvPr>
@@ -4301,7 +5418,7 @@
           <p:cNvPr id="3" name="Text Placeholder 2">
             <a:extLst>
               <a:ext uri="{FF2B5EF4-FFF2-40B4-BE49-F238E27FC236}">
-                <a16:creationId xmlns:a16="http://schemas.microsoft.com/office/drawing/2014/main" id="{C20E2107-1A40-1234-2620-0414A75DC1D0}"/>
+                <a16:creationId xmlns:a16="http://schemas.microsoft.com/office/drawing/2014/main" id="{53247260-3BCF-E841-5693-E916D73ABED2}"/>
               </a:ext>
             </a:extLst>
           </p:cNvPr>
@@ -4326,7 +5443,7 @@
           <p:cNvPr id="4" name="Text Placeholder 3">
             <a:extLst>
               <a:ext uri="{FF2B5EF4-FFF2-40B4-BE49-F238E27FC236}">
-                <a16:creationId xmlns:a16="http://schemas.microsoft.com/office/drawing/2014/main" id="{9FE819F6-E0A6-7C58-BE90-059D26D52AB8}"/>
+                <a16:creationId xmlns:a16="http://schemas.microsoft.com/office/drawing/2014/main" id="{CA2A1045-817D-A69B-05F7-94943C8EAF8A}"/>
               </a:ext>
             </a:extLst>
           </p:cNvPr>
@@ -4351,7 +5468,7 @@
           <p:cNvPr id="5" name="Title 4">
             <a:extLst>
               <a:ext uri="{FF2B5EF4-FFF2-40B4-BE49-F238E27FC236}">
-                <a16:creationId xmlns:a16="http://schemas.microsoft.com/office/drawing/2014/main" id="{920350B5-D9C9-CB49-D452-CA19A07B0B22}"/>
+                <a16:creationId xmlns:a16="http://schemas.microsoft.com/office/drawing/2014/main" id="{99EB84DA-AEAD-0BC4-7656-5D49752E6712}"/>
               </a:ext>
             </a:extLst>
           </p:cNvPr>
@@ -4368,12 +5485,8 @@
           <a:lstStyle/>
           <a:p>
             <a:r>
-              <a:rPr lang="en-US" dirty="0" err="1"/>
-              <a:t>Dataframes</a:t>
-            </a:r>
-            <a:r>
               <a:rPr lang="en-US" dirty="0"/>
-              <a:t> behind the scene</a:t>
+              <a:t>From Driver to Jobs</a:t>
             </a:r>
           </a:p>
         </p:txBody>
@@ -4383,7 +5496,7 @@
           <p:cNvPr id="6" name="Content Placeholder 5">
             <a:extLst>
               <a:ext uri="{FF2B5EF4-FFF2-40B4-BE49-F238E27FC236}">
-                <a16:creationId xmlns:a16="http://schemas.microsoft.com/office/drawing/2014/main" id="{02A47CE1-7014-8961-A712-C0F1A2B9FADD}"/>
+                <a16:creationId xmlns:a16="http://schemas.microsoft.com/office/drawing/2014/main" id="{0FE97F48-8517-4C80-D32A-D0AC264F2E09}"/>
               </a:ext>
             </a:extLst>
           </p:cNvPr>
@@ -4394,32 +5507,18 @@
             <p:ph idx="1"/>
           </p:nvPr>
         </p:nvSpPr>
-        <p:spPr>
-          <a:xfrm>
-            <a:off x="893763" y="8293666"/>
-            <a:ext cx="11217275" cy="491559"/>
-          </a:xfrm>
-        </p:spPr>
-        <p:txBody>
-          <a:bodyPr anchor="ctr">
-            <a:normAutofit/>
-          </a:bodyPr>
+        <p:spPr/>
+        <p:txBody>
+          <a:bodyPr/>
           <a:lstStyle/>
           <a:p>
             <a:pPr marL="0" indent="0">
               <a:buNone/>
             </a:pPr>
             <a:r>
-              <a:rPr lang="en-US" sz="1800" dirty="0"/>
-              <a:t>Ref: </a:t>
-            </a:r>
-            <a:r>
-              <a:rPr lang="en-US" sz="1800" dirty="0">
-                <a:hlinkClick r:id="rId2"/>
-              </a:rPr>
-              <a:t>Spark APIs</a:t>
-            </a:r>
-            <a:endParaRPr lang="en-US" sz="1800" dirty="0"/>
+              <a:rPr lang="en-US" dirty="0"/>
+              <a:t>Driver converts your Spark application into one or more Spark jobs</a:t>
+            </a:r>
           </a:p>
         </p:txBody>
       </p:sp>
@@ -4428,7 +5527,7 @@
           <p:cNvPr id="8" name="Picture 7">
             <a:extLst>
               <a:ext uri="{FF2B5EF4-FFF2-40B4-BE49-F238E27FC236}">
-                <a16:creationId xmlns:a16="http://schemas.microsoft.com/office/drawing/2014/main" id="{E8BE5E09-535A-BBAC-0612-CCD098AD4560}"/>
+                <a16:creationId xmlns:a16="http://schemas.microsoft.com/office/drawing/2014/main" id="{89C86868-A910-AF34-CDC4-DBC4CF34F24F}"/>
               </a:ext>
             </a:extLst>
           </p:cNvPr>
@@ -4437,16 +5536,117 @@
           </p:cNvPicPr>
           <p:nvPr/>
         </p:nvPicPr>
-        <p:blipFill>
-          <a:blip r:embed="rId3"/>
-          <a:stretch>
-            <a:fillRect/>
-          </a:stretch>
+        <p:blipFill rotWithShape="1">
+          <a:blip r:embed="rId2"/>
+          <a:srcRect r="57760"/>
+          <a:stretch/>
         </p:blipFill>
         <p:spPr>
           <a:xfrm>
-            <a:off x="0" y="3245973"/>
-            <a:ext cx="13004800" cy="3261654"/>
+            <a:off x="0" y="4082095"/>
+            <a:ext cx="5493224" cy="3718468"/>
+          </a:xfrm>
+          <a:prstGeom prst="rect">
+            <a:avLst/>
+          </a:prstGeom>
+        </p:spPr>
+      </p:pic>
+      <p:sp>
+        <p:nvSpPr>
+          <p:cNvPr id="9" name="TextBox 8">
+            <a:extLst>
+              <a:ext uri="{FF2B5EF4-FFF2-40B4-BE49-F238E27FC236}">
+                <a16:creationId xmlns:a16="http://schemas.microsoft.com/office/drawing/2014/main" id="{021B36D9-DEE9-5EDA-7CC5-AF4E84DD62D9}"/>
+              </a:ext>
+            </a:extLst>
+          </p:cNvPr>
+          <p:cNvSpPr txBox="1"/>
+          <p:nvPr/>
+        </p:nvSpPr>
+        <p:spPr>
+          <a:xfrm>
+            <a:off x="51961" y="9412245"/>
+            <a:ext cx="2673309" cy="246221"/>
+          </a:xfrm>
+          <a:prstGeom prst="rect">
+            <a:avLst/>
+          </a:prstGeom>
+          <a:noFill/>
+        </p:spPr>
+        <p:txBody>
+          <a:bodyPr wrap="square" rtlCol="0">
+            <a:spAutoFit/>
+          </a:bodyPr>
+          <a:lstStyle/>
+          <a:p>
+            <a:pPr algn="l"/>
+            <a:r>
+              <a:rPr lang="en-US" sz="1000" b="0" dirty="0"/>
+              <a:t>Ref: Learning Spark, </a:t>
+            </a:r>
+            <a:r>
+              <a:rPr lang="en-US" sz="1000" b="0" dirty="0" err="1"/>
+              <a:t>Damji</a:t>
+            </a:r>
+            <a:r>
+              <a:rPr lang="en-US" sz="1000" b="0" dirty="0"/>
+              <a:t> et al</a:t>
+            </a:r>
+          </a:p>
+        </p:txBody>
+      </p:sp>
+      <p:pic>
+        <p:nvPicPr>
+          <p:cNvPr id="12" name="Picture 11">
+            <a:extLst>
+              <a:ext uri="{FF2B5EF4-FFF2-40B4-BE49-F238E27FC236}">
+                <a16:creationId xmlns:a16="http://schemas.microsoft.com/office/drawing/2014/main" id="{7486C3E5-D1A8-AF91-9EB4-608928B92995}"/>
+              </a:ext>
+            </a:extLst>
+          </p:cNvPr>
+          <p:cNvPicPr>
+            <a:picLocks noChangeAspect="1"/>
+          </p:cNvPicPr>
+          <p:nvPr/>
+        </p:nvPicPr>
+        <p:blipFill rotWithShape="1">
+          <a:blip r:embed="rId3"/>
+          <a:srcRect b="42384"/>
+          <a:stretch/>
+        </p:blipFill>
+        <p:spPr>
+          <a:xfrm>
+            <a:off x="5835536" y="4599624"/>
+            <a:ext cx="4677428" cy="554351"/>
+          </a:xfrm>
+          <a:prstGeom prst="rect">
+            <a:avLst/>
+          </a:prstGeom>
+        </p:spPr>
+      </p:pic>
+      <p:pic>
+        <p:nvPicPr>
+          <p:cNvPr id="13" name="Picture 12">
+            <a:extLst>
+              <a:ext uri="{FF2B5EF4-FFF2-40B4-BE49-F238E27FC236}">
+                <a16:creationId xmlns:a16="http://schemas.microsoft.com/office/drawing/2014/main" id="{C80EF27E-1B3B-6220-71B5-A3947CA41DAB}"/>
+              </a:ext>
+            </a:extLst>
+          </p:cNvPr>
+          <p:cNvPicPr>
+            <a:picLocks noChangeAspect="1"/>
+          </p:cNvPicPr>
+          <p:nvPr/>
+        </p:nvPicPr>
+        <p:blipFill rotWithShape="1">
+          <a:blip r:embed="rId3"/>
+          <a:srcRect t="50288"/>
+          <a:stretch/>
+        </p:blipFill>
+        <p:spPr>
+          <a:xfrm>
+            <a:off x="5835536" y="5643342"/>
+            <a:ext cx="4677428" cy="478309"/>
           </a:xfrm>
           <a:prstGeom prst="rect">
             <a:avLst/>
@@ -4456,7 +5656,259 @@
     </p:spTree>
     <p:extLst>
       <p:ext uri="{BB962C8B-B14F-4D97-AF65-F5344CB8AC3E}">
-        <p14:creationId xmlns:p14="http://schemas.microsoft.com/office/powerpoint/2010/main" val="2596552061"/>
+        <p14:creationId xmlns:p14="http://schemas.microsoft.com/office/powerpoint/2010/main" val="379067628"/>
+      </p:ext>
+    </p:extLst>
+  </p:cSld>
+  <p:clrMapOvr>
+    <a:masterClrMapping/>
+  </p:clrMapOvr>
+</p:sld>
+</file>
+
+<file path=ppt/slides/slide9.xml><?xml version="1.0" encoding="utf-8"?>
+<p:sld xmlns:a="http://schemas.openxmlformats.org/drawingml/2006/main" xmlns:r="http://schemas.openxmlformats.org/officeDocument/2006/relationships" xmlns:p="http://schemas.openxmlformats.org/presentationml/2006/main">
+  <p:cSld>
+    <p:spTree>
+      <p:nvGrpSpPr>
+        <p:cNvPr id="1" name=""/>
+        <p:cNvGrpSpPr/>
+        <p:nvPr/>
+      </p:nvGrpSpPr>
+      <p:grpSpPr>
+        <a:xfrm>
+          <a:off x="0" y="0"/>
+          <a:ext cx="0" cy="0"/>
+          <a:chOff x="0" y="0"/>
+          <a:chExt cx="0" cy="0"/>
+        </a:xfrm>
+      </p:grpSpPr>
+      <p:sp>
+        <p:nvSpPr>
+          <p:cNvPr id="2" name="Text Placeholder 1">
+            <a:extLst>
+              <a:ext uri="{FF2B5EF4-FFF2-40B4-BE49-F238E27FC236}">
+                <a16:creationId xmlns:a16="http://schemas.microsoft.com/office/drawing/2014/main" id="{F29E16DD-BF30-BD89-4FF6-8C9E304CAC9D}"/>
+              </a:ext>
+            </a:extLst>
+          </p:cNvPr>
+          <p:cNvSpPr>
+            <a:spLocks noGrp="1"/>
+          </p:cNvSpPr>
+          <p:nvPr>
+            <p:ph type="body" sz="quarter" idx="15"/>
+          </p:nvPr>
+        </p:nvSpPr>
+        <p:spPr/>
+        <p:txBody>
+          <a:bodyPr/>
+          <a:lstStyle/>
+          <a:p>
+            <a:endParaRPr lang="en-US"/>
+          </a:p>
+        </p:txBody>
+      </p:sp>
+      <p:sp>
+        <p:nvSpPr>
+          <p:cNvPr id="3" name="Text Placeholder 2">
+            <a:extLst>
+              <a:ext uri="{FF2B5EF4-FFF2-40B4-BE49-F238E27FC236}">
+                <a16:creationId xmlns:a16="http://schemas.microsoft.com/office/drawing/2014/main" id="{53247260-3BCF-E841-5693-E916D73ABED2}"/>
+              </a:ext>
+            </a:extLst>
+          </p:cNvPr>
+          <p:cNvSpPr>
+            <a:spLocks noGrp="1"/>
+          </p:cNvSpPr>
+          <p:nvPr>
+            <p:ph type="body" sz="quarter" idx="17"/>
+          </p:nvPr>
+        </p:nvSpPr>
+        <p:spPr/>
+        <p:txBody>
+          <a:bodyPr/>
+          <a:lstStyle/>
+          <a:p>
+            <a:endParaRPr lang="en-US"/>
+          </a:p>
+        </p:txBody>
+      </p:sp>
+      <p:sp>
+        <p:nvSpPr>
+          <p:cNvPr id="4" name="Text Placeholder 3">
+            <a:extLst>
+              <a:ext uri="{FF2B5EF4-FFF2-40B4-BE49-F238E27FC236}">
+                <a16:creationId xmlns:a16="http://schemas.microsoft.com/office/drawing/2014/main" id="{CA2A1045-817D-A69B-05F7-94943C8EAF8A}"/>
+              </a:ext>
+            </a:extLst>
+          </p:cNvPr>
+          <p:cNvSpPr>
+            <a:spLocks noGrp="1"/>
+          </p:cNvSpPr>
+          <p:nvPr>
+            <p:ph type="body" sz="quarter" idx="16"/>
+          </p:nvPr>
+        </p:nvSpPr>
+        <p:spPr/>
+        <p:txBody>
+          <a:bodyPr/>
+          <a:lstStyle/>
+          <a:p>
+            <a:endParaRPr lang="en-US"/>
+          </a:p>
+        </p:txBody>
+      </p:sp>
+      <p:sp>
+        <p:nvSpPr>
+          <p:cNvPr id="5" name="Title 4">
+            <a:extLst>
+              <a:ext uri="{FF2B5EF4-FFF2-40B4-BE49-F238E27FC236}">
+                <a16:creationId xmlns:a16="http://schemas.microsoft.com/office/drawing/2014/main" id="{99EB84DA-AEAD-0BC4-7656-5D49752E6712}"/>
+              </a:ext>
+            </a:extLst>
+          </p:cNvPr>
+          <p:cNvSpPr>
+            <a:spLocks noGrp="1"/>
+          </p:cNvSpPr>
+          <p:nvPr>
+            <p:ph type="title"/>
+          </p:nvPr>
+        </p:nvSpPr>
+        <p:spPr/>
+        <p:txBody>
+          <a:bodyPr/>
+          <a:lstStyle/>
+          <a:p>
+            <a:r>
+              <a:rPr lang="en-US" dirty="0"/>
+              <a:t>Jobs and Stages</a:t>
+            </a:r>
+          </a:p>
+        </p:txBody>
+      </p:sp>
+      <p:sp>
+        <p:nvSpPr>
+          <p:cNvPr id="6" name="Content Placeholder 5">
+            <a:extLst>
+              <a:ext uri="{FF2B5EF4-FFF2-40B4-BE49-F238E27FC236}">
+                <a16:creationId xmlns:a16="http://schemas.microsoft.com/office/drawing/2014/main" id="{0FE97F48-8517-4C80-D32A-D0AC264F2E09}"/>
+              </a:ext>
+            </a:extLst>
+          </p:cNvPr>
+          <p:cNvSpPr>
+            <a:spLocks noGrp="1"/>
+          </p:cNvSpPr>
+          <p:nvPr>
+            <p:ph idx="1"/>
+          </p:nvPr>
+        </p:nvSpPr>
+        <p:spPr/>
+        <p:txBody>
+          <a:bodyPr/>
+          <a:lstStyle/>
+          <a:p>
+            <a:pPr marL="0" indent="0">
+              <a:buNone/>
+            </a:pPr>
+            <a:r>
+              <a:rPr lang="en-US" dirty="0"/>
+              <a:t>Stages are created based on what operations can be performed serially or in parallel. Not all Spark operations can happen in a single stage, so they may be divided into multiple stages.</a:t>
+            </a:r>
+          </a:p>
+          <a:p>
+            <a:pPr marL="0" indent="0">
+              <a:buNone/>
+            </a:pPr>
+            <a:endParaRPr lang="en-US" dirty="0"/>
+          </a:p>
+          <a:p>
+            <a:pPr marL="0" indent="0">
+              <a:buNone/>
+            </a:pPr>
+            <a:r>
+              <a:rPr lang="en-US" dirty="0"/>
+              <a:t>(Page 28). </a:t>
+            </a:r>
+          </a:p>
+        </p:txBody>
+      </p:sp>
+      <p:pic>
+        <p:nvPicPr>
+          <p:cNvPr id="8" name="Picture 7">
+            <a:extLst>
+              <a:ext uri="{FF2B5EF4-FFF2-40B4-BE49-F238E27FC236}">
+                <a16:creationId xmlns:a16="http://schemas.microsoft.com/office/drawing/2014/main" id="{89C86868-A910-AF34-CDC4-DBC4CF34F24F}"/>
+              </a:ext>
+            </a:extLst>
+          </p:cNvPr>
+          <p:cNvPicPr>
+            <a:picLocks noChangeAspect="1"/>
+          </p:cNvPicPr>
+          <p:nvPr/>
+        </p:nvPicPr>
+        <p:blipFill rotWithShape="1">
+          <a:blip r:embed="rId2"/>
+          <a:srcRect l="1" r="22813"/>
+          <a:stretch/>
+        </p:blipFill>
+        <p:spPr>
+          <a:xfrm>
+            <a:off x="0" y="4082095"/>
+            <a:ext cx="10037928" cy="3718468"/>
+          </a:xfrm>
+          <a:prstGeom prst="rect">
+            <a:avLst/>
+          </a:prstGeom>
+        </p:spPr>
+      </p:pic>
+      <p:sp>
+        <p:nvSpPr>
+          <p:cNvPr id="9" name="TextBox 8">
+            <a:extLst>
+              <a:ext uri="{FF2B5EF4-FFF2-40B4-BE49-F238E27FC236}">
+                <a16:creationId xmlns:a16="http://schemas.microsoft.com/office/drawing/2014/main" id="{A0AF29AA-8D3D-6B73-115A-F3BEDA0BC7E1}"/>
+              </a:ext>
+            </a:extLst>
+          </p:cNvPr>
+          <p:cNvSpPr txBox="1"/>
+          <p:nvPr/>
+        </p:nvSpPr>
+        <p:spPr>
+          <a:xfrm>
+            <a:off x="51961" y="9412245"/>
+            <a:ext cx="2673309" cy="246221"/>
+          </a:xfrm>
+          <a:prstGeom prst="rect">
+            <a:avLst/>
+          </a:prstGeom>
+          <a:noFill/>
+        </p:spPr>
+        <p:txBody>
+          <a:bodyPr wrap="square" rtlCol="0">
+            <a:spAutoFit/>
+          </a:bodyPr>
+          <a:lstStyle/>
+          <a:p>
+            <a:pPr algn="l"/>
+            <a:r>
+              <a:rPr lang="en-US" sz="1000" b="0" dirty="0"/>
+              <a:t>Ref: Learning Spark, </a:t>
+            </a:r>
+            <a:r>
+              <a:rPr lang="en-US" sz="1000" b="0" dirty="0" err="1"/>
+              <a:t>Damji</a:t>
+            </a:r>
+            <a:r>
+              <a:rPr lang="en-US" sz="1000" b="0" dirty="0"/>
+              <a:t> et al</a:t>
+            </a:r>
+          </a:p>
+        </p:txBody>
+      </p:sp>
+    </p:spTree>
+    <p:extLst>
+      <p:ext uri="{BB962C8B-B14F-4D97-AF65-F5344CB8AC3E}">
+        <p14:creationId xmlns:p14="http://schemas.microsoft.com/office/powerpoint/2010/main" val="3499451927"/>
       </p:ext>
     </p:extLst>
   </p:cSld>

</xml_diff>

<commit_message>
Finished how spark works
</commit_message>
<xml_diff>
--- a/training-spark/1_Spark.pptx
+++ b/training-spark/1_Spark.pptx
@@ -441,7 +441,7 @@
           <a:p>
             <a:fld id="{154C1C9F-968B-45D4-9FBD-EA39F2175159}" type="datetimeFigureOut">
               <a:rPr lang="en-US" smtClean="0"/>
-              <a:t>7/16/2022</a:t>
+              <a:t>7/28/2022</a:t>
             </a:fld>
             <a:endParaRPr lang="en-US"/>
           </a:p>
@@ -1726,7 +1726,7 @@
           <a:p>
             <a:fld id="{0F1B7D9C-4F60-C246-8CA4-396C0346DE33}" type="datetimeFigureOut">
               <a:rPr lang="it-IT" smtClean="0"/>
-              <a:t>16/07/2022</a:t>
+              <a:t>28/07/2022</a:t>
             </a:fld>
             <a:endParaRPr lang="it-IT"/>
           </a:p>
@@ -2381,7 +2381,7 @@
           <a:p>
             <a:fld id="{A2FF5F4A-4507-894B-98D1-9441DD15C475}" type="datetimeFigureOut">
               <a:rPr lang="it-IT" smtClean="0"/>
-              <a:t>16/07/2022</a:t>
+              <a:t>28/07/2022</a:t>
             </a:fld>
             <a:endParaRPr lang="it-IT" dirty="0"/>
           </a:p>
@@ -3038,7 +3038,7 @@
           <a:p>
             <a:r>
               <a:rPr lang="en-US" dirty="0"/>
-              <a:t>Tasks and</a:t>
+              <a:t>Stages and Tasks</a:t>
             </a:r>
           </a:p>
         </p:txBody>
@@ -3280,51 +3280,156 @@
           </a:p>
         </p:txBody>
       </p:sp>
-      <p:sp>
-        <p:nvSpPr>
-          <p:cNvPr id="6" name="Content Placeholder 5">
-            <a:extLst>
-              <a:ext uri="{FF2B5EF4-FFF2-40B4-BE49-F238E27FC236}">
-                <a16:creationId xmlns:a16="http://schemas.microsoft.com/office/drawing/2014/main" id="{82CE2ACA-F471-1A6B-EEB5-05DE0EC00C01}"/>
-              </a:ext>
-            </a:extLst>
-          </p:cNvPr>
-          <p:cNvSpPr>
-            <a:spLocks noGrp="1"/>
-          </p:cNvSpPr>
-          <p:nvPr>
-            <p:ph idx="1"/>
-          </p:nvPr>
-        </p:nvSpPr>
-        <p:spPr/>
-        <p:txBody>
-          <a:bodyPr/>
+      <p:pic>
+        <p:nvPicPr>
+          <p:cNvPr id="8" name="Picture 7">
+            <a:extLst>
+              <a:ext uri="{FF2B5EF4-FFF2-40B4-BE49-F238E27FC236}">
+                <a16:creationId xmlns:a16="http://schemas.microsoft.com/office/drawing/2014/main" id="{B6985BC8-12E7-4058-94CC-46361C1D5EB8}"/>
+              </a:ext>
+            </a:extLst>
+          </p:cNvPr>
+          <p:cNvPicPr>
+            <a:picLocks noChangeAspect="1"/>
+          </p:cNvPicPr>
+          <p:nvPr/>
+        </p:nvPicPr>
+        <p:blipFill>
+          <a:blip r:embed="rId2"/>
+          <a:stretch>
+            <a:fillRect/>
+          </a:stretch>
+        </p:blipFill>
+        <p:spPr>
+          <a:xfrm>
+            <a:off x="614149" y="2132282"/>
+            <a:ext cx="6590352" cy="4136525"/>
+          </a:xfrm>
+          <a:prstGeom prst="rect">
+            <a:avLst/>
+          </a:prstGeom>
+        </p:spPr>
+      </p:pic>
+      <p:pic>
+        <p:nvPicPr>
+          <p:cNvPr id="10" name="Picture 9">
+            <a:extLst>
+              <a:ext uri="{FF2B5EF4-FFF2-40B4-BE49-F238E27FC236}">
+                <a16:creationId xmlns:a16="http://schemas.microsoft.com/office/drawing/2014/main" id="{589CA34C-7F46-5C75-50FD-D13233D7C7F7}"/>
+              </a:ext>
+            </a:extLst>
+          </p:cNvPr>
+          <p:cNvPicPr>
+            <a:picLocks noChangeAspect="1"/>
+          </p:cNvPicPr>
+          <p:nvPr/>
+        </p:nvPicPr>
+        <p:blipFill>
+          <a:blip r:embed="rId3"/>
+          <a:stretch>
+            <a:fillRect/>
+          </a:stretch>
+        </p:blipFill>
+        <p:spPr>
+          <a:xfrm>
+            <a:off x="7103658" y="3273429"/>
+            <a:ext cx="5621361" cy="2526805"/>
+          </a:xfrm>
+          <a:prstGeom prst="rect">
+            <a:avLst/>
+          </a:prstGeom>
+        </p:spPr>
+      </p:pic>
+      <p:sp>
+        <p:nvSpPr>
+          <p:cNvPr id="12" name="TextBox 11">
+            <a:extLst>
+              <a:ext uri="{FF2B5EF4-FFF2-40B4-BE49-F238E27FC236}">
+                <a16:creationId xmlns:a16="http://schemas.microsoft.com/office/drawing/2014/main" id="{C1F5B651-A5C7-5A5B-72D2-CB66A360F5F8}"/>
+              </a:ext>
+            </a:extLst>
+          </p:cNvPr>
+          <p:cNvSpPr txBox="1"/>
+          <p:nvPr/>
+        </p:nvSpPr>
+        <p:spPr>
+          <a:xfrm>
+            <a:off x="464024" y="6347935"/>
+            <a:ext cx="12187451" cy="1384995"/>
+          </a:xfrm>
+          <a:prstGeom prst="rect">
+            <a:avLst/>
+          </a:prstGeom>
+          <a:noFill/>
+        </p:spPr>
+        <p:txBody>
+          <a:bodyPr wrap="square">
+            <a:spAutoFit/>
+          </a:bodyPr>
           <a:lstStyle/>
           <a:p>
-            <a:r>
-              <a:rPr lang="en-US" dirty="0">
-                <a:highlight>
-                  <a:srgbClr val="FFFF00"/>
-                </a:highlight>
-                <a:hlinkClick r:id="rId2"/>
+            <a:pPr algn="l"/>
+            <a:r>
+              <a:rPr lang="en-US" sz="2800" b="0" i="0" dirty="0">
+                <a:solidFill>
+                  <a:srgbClr val="343A40"/>
+                </a:solidFill>
+                <a:effectLst/>
+                <a:latin typeface="Avenir Black"/>
               </a:rPr>
-              <a:t>https://www.protechtraining.com/blog/post/tuning-apache-spark-jobs-the-easy-way-web-ui-stage-detail-view-911</a:t>
-            </a:r>
-            <a:endParaRPr lang="en-US" dirty="0">
-              <a:highlight>
-                <a:srgbClr val="FFFF00"/>
-              </a:highlight>
+              <a:t>Spark's stages represent segments of work that run from data input (or data read from a previous shuffle) through a set of operations called tasks — one task per data partition — all the way to a data output or a write into a subsequent shuffle.</a:t>
+            </a:r>
+            <a:endParaRPr lang="en-US" sz="2800" dirty="0">
+              <a:latin typeface="Avenir Black"/>
             </a:endParaRPr>
           </a:p>
-          <a:p>
-            <a:r>
-              <a:rPr lang="en-US" dirty="0">
-                <a:highlight>
-                  <a:srgbClr val="FFFF00"/>
-                </a:highlight>
+        </p:txBody>
+      </p:sp>
+      <p:sp>
+        <p:nvSpPr>
+          <p:cNvPr id="13" name="TextBox 12">
+            <a:extLst>
+              <a:ext uri="{FF2B5EF4-FFF2-40B4-BE49-F238E27FC236}">
+                <a16:creationId xmlns:a16="http://schemas.microsoft.com/office/drawing/2014/main" id="{6DA86AA9-803C-F07A-F0CE-7CCD19C03BD5}"/>
+              </a:ext>
+            </a:extLst>
+          </p:cNvPr>
+          <p:cNvSpPr txBox="1"/>
+          <p:nvPr/>
+        </p:nvSpPr>
+        <p:spPr>
+          <a:xfrm>
+            <a:off x="309104" y="8311216"/>
+            <a:ext cx="4508556" cy="338554"/>
+          </a:xfrm>
+          <a:prstGeom prst="rect">
+            <a:avLst/>
+          </a:prstGeom>
+          <a:noFill/>
+        </p:spPr>
+        <p:txBody>
+          <a:bodyPr wrap="square">
+            <a:spAutoFit/>
+          </a:bodyPr>
+          <a:lstStyle/>
+          <a:p>
+            <a:pPr algn="l"/>
+            <a:r>
+              <a:rPr lang="en-US" sz="1600" b="0" dirty="0">
+                <a:latin typeface="Avenir Black"/>
               </a:rPr>
-              <a:t>????</a:t>
-            </a:r>
+              <a:t>Ref: </a:t>
+            </a:r>
+            <a:r>
+              <a:rPr lang="en-US" sz="1600" b="0" dirty="0">
+                <a:latin typeface="Avenir Black"/>
+                <a:hlinkClick r:id="rId4"/>
+              </a:rPr>
+              <a:t>Spark Jobs the Easy Way: Web UI Stage View</a:t>
+            </a:r>
+            <a:endParaRPr lang="en-US" sz="1600" b="0" dirty="0">
+              <a:latin typeface="Avenir Black"/>
+            </a:endParaRPr>
           </a:p>
         </p:txBody>
       </p:sp>
@@ -3342,7 +3447,7 @@
 </file>
 
 <file path=ppt/slides/slide12.xml><?xml version="1.0" encoding="utf-8"?>
-<p:sld xmlns:a="http://schemas.openxmlformats.org/drawingml/2006/main" xmlns:r="http://schemas.openxmlformats.org/officeDocument/2006/relationships" xmlns:p="http://schemas.openxmlformats.org/presentationml/2006/main">
+<p:sld xmlns:a="http://schemas.openxmlformats.org/drawingml/2006/main" xmlns:r="http://schemas.openxmlformats.org/officeDocument/2006/relationships" xmlns:p="http://schemas.openxmlformats.org/presentationml/2006/main" show="0">
   <p:cSld>
     <p:spTree>
       <p:nvGrpSpPr>

</xml_diff>